<commit_message>
new notebook for tp oscillateurs
</commit_message>
<xml_diff>
--- a/Python/LP17/LP17.pptx
+++ b/Python/LP17/LP17.pptx
@@ -11,6 +11,7 @@
     <p:sldId id="261" r:id="rId5"/>
     <p:sldId id="259" r:id="rId6"/>
     <p:sldId id="260" r:id="rId7"/>
+    <p:sldId id="262" r:id="rId8"/>
   </p:sldIdLst>
   <p:sldSz cx="12192000" cy="6858000"/>
   <p:notesSz cx="6858000" cy="9144000"/>
@@ -109,6 +110,11 @@
       </a:defRPr>
     </a:lvl9pPr>
   </p:defaultTextStyle>
+  <p:extLst>
+    <p:ext uri="{EFAFB233-063F-42B5-8137-9DF3F51BA10A}">
+      <p15:sldGuideLst xmlns:p15="http://schemas.microsoft.com/office/powerpoint/2012/main"/>
+    </p:ext>
+  </p:extLst>
 </p:presentation>
 </file>
 
@@ -243,7 +249,7 @@
           <a:p>
             <a:fld id="{C262451B-073C-4FAC-8D0B-6648421A7945}" type="datetimeFigureOut">
               <a:rPr lang="fr-FR" smtClean="0"/>
-              <a:t>10/10/2019</a:t>
+              <a:t>13/10/2019</a:t>
             </a:fld>
             <a:endParaRPr lang="fr-FR"/>
           </a:p>
@@ -413,7 +419,7 @@
           <a:p>
             <a:fld id="{C262451B-073C-4FAC-8D0B-6648421A7945}" type="datetimeFigureOut">
               <a:rPr lang="fr-FR" smtClean="0"/>
-              <a:t>10/10/2019</a:t>
+              <a:t>13/10/2019</a:t>
             </a:fld>
             <a:endParaRPr lang="fr-FR"/>
           </a:p>
@@ -593,7 +599,7 @@
           <a:p>
             <a:fld id="{C262451B-073C-4FAC-8D0B-6648421A7945}" type="datetimeFigureOut">
               <a:rPr lang="fr-FR" smtClean="0"/>
-              <a:t>10/10/2019</a:t>
+              <a:t>13/10/2019</a:t>
             </a:fld>
             <a:endParaRPr lang="fr-FR"/>
           </a:p>
@@ -763,7 +769,7 @@
           <a:p>
             <a:fld id="{C262451B-073C-4FAC-8D0B-6648421A7945}" type="datetimeFigureOut">
               <a:rPr lang="fr-FR" smtClean="0"/>
-              <a:t>10/10/2019</a:t>
+              <a:t>13/10/2019</a:t>
             </a:fld>
             <a:endParaRPr lang="fr-FR"/>
           </a:p>
@@ -1009,7 +1015,7 @@
           <a:p>
             <a:fld id="{C262451B-073C-4FAC-8D0B-6648421A7945}" type="datetimeFigureOut">
               <a:rPr lang="fr-FR" smtClean="0"/>
-              <a:t>10/10/2019</a:t>
+              <a:t>13/10/2019</a:t>
             </a:fld>
             <a:endParaRPr lang="fr-FR"/>
           </a:p>
@@ -1241,7 +1247,7 @@
           <a:p>
             <a:fld id="{C262451B-073C-4FAC-8D0B-6648421A7945}" type="datetimeFigureOut">
               <a:rPr lang="fr-FR" smtClean="0"/>
-              <a:t>10/10/2019</a:t>
+              <a:t>13/10/2019</a:t>
             </a:fld>
             <a:endParaRPr lang="fr-FR"/>
           </a:p>
@@ -1608,7 +1614,7 @@
           <a:p>
             <a:fld id="{C262451B-073C-4FAC-8D0B-6648421A7945}" type="datetimeFigureOut">
               <a:rPr lang="fr-FR" smtClean="0"/>
-              <a:t>10/10/2019</a:t>
+              <a:t>13/10/2019</a:t>
             </a:fld>
             <a:endParaRPr lang="fr-FR"/>
           </a:p>
@@ -1726,7 +1732,7 @@
           <a:p>
             <a:fld id="{C262451B-073C-4FAC-8D0B-6648421A7945}" type="datetimeFigureOut">
               <a:rPr lang="fr-FR" smtClean="0"/>
-              <a:t>10/10/2019</a:t>
+              <a:t>13/10/2019</a:t>
             </a:fld>
             <a:endParaRPr lang="fr-FR"/>
           </a:p>
@@ -1821,7 +1827,7 @@
           <a:p>
             <a:fld id="{C262451B-073C-4FAC-8D0B-6648421A7945}" type="datetimeFigureOut">
               <a:rPr lang="fr-FR" smtClean="0"/>
-              <a:t>10/10/2019</a:t>
+              <a:t>13/10/2019</a:t>
             </a:fld>
             <a:endParaRPr lang="fr-FR"/>
           </a:p>
@@ -2098,7 +2104,7 @@
           <a:p>
             <a:fld id="{C262451B-073C-4FAC-8D0B-6648421A7945}" type="datetimeFigureOut">
               <a:rPr lang="fr-FR" smtClean="0"/>
-              <a:t>10/10/2019</a:t>
+              <a:t>13/10/2019</a:t>
             </a:fld>
             <a:endParaRPr lang="fr-FR"/>
           </a:p>
@@ -2351,7 +2357,7 @@
           <a:p>
             <a:fld id="{C262451B-073C-4FAC-8D0B-6648421A7945}" type="datetimeFigureOut">
               <a:rPr lang="fr-FR" smtClean="0"/>
-              <a:t>10/10/2019</a:t>
+              <a:t>13/10/2019</a:t>
             </a:fld>
             <a:endParaRPr lang="fr-FR"/>
           </a:p>
@@ -2564,7 +2570,7 @@
           <a:p>
             <a:fld id="{C262451B-073C-4FAC-8D0B-6648421A7945}" type="datetimeFigureOut">
               <a:rPr lang="fr-FR" smtClean="0"/>
-              <a:t>10/10/2019</a:t>
+              <a:t>13/10/2019</a:t>
             </a:fld>
             <a:endParaRPr lang="fr-FR"/>
           </a:p>
@@ -3371,6 +3377,73 @@
 </p:sld>
 </file>
 
+<file path=ppt/slides/slide7.xml><?xml version="1.0" encoding="utf-8"?>
+<p:sld xmlns:a="http://schemas.openxmlformats.org/drawingml/2006/main" xmlns:r="http://schemas.openxmlformats.org/officeDocument/2006/relationships" xmlns:p="http://schemas.openxmlformats.org/presentationml/2006/main">
+  <p:cSld>
+    <p:spTree>
+      <p:nvGrpSpPr>
+        <p:cNvPr id="1" name=""/>
+        <p:cNvGrpSpPr/>
+        <p:nvPr/>
+      </p:nvGrpSpPr>
+      <p:grpSpPr>
+        <a:xfrm>
+          <a:off x="0" y="0"/>
+          <a:ext cx="0" cy="0"/>
+          <a:chOff x="0" y="0"/>
+          <a:chExt cx="0" cy="0"/>
+        </a:xfrm>
+      </p:grpSpPr>
+      <p:pic>
+        <p:nvPicPr>
+          <p:cNvPr id="2" name="Image 1"/>
+          <p:cNvPicPr>
+            <a:picLocks noChangeAspect="1"/>
+          </p:cNvPicPr>
+          <p:nvPr/>
+        </p:nvPicPr>
+        <p:blipFill>
+          <a:blip r:embed="rId2">
+            <a:extLst>
+              <a:ext uri="{28A0092B-C50C-407E-A947-70E740481C1C}">
+                <a14:useLocalDpi xmlns:a14="http://schemas.microsoft.com/office/drawing/2010/main" val="0"/>
+              </a:ext>
+            </a:extLst>
+          </a:blip>
+          <a:stretch>
+            <a:fillRect/>
+          </a:stretch>
+        </p:blipFill>
+        <p:spPr>
+          <a:xfrm>
+            <a:off x="1050202" y="-7038"/>
+            <a:ext cx="10081260" cy="6865038"/>
+          </a:xfrm>
+          <a:prstGeom prst="rect">
+            <a:avLst/>
+          </a:prstGeom>
+        </p:spPr>
+      </p:pic>
+    </p:spTree>
+    <p:extLst>
+      <p:ext uri="{BB962C8B-B14F-4D97-AF65-F5344CB8AC3E}">
+        <p14:creationId xmlns:p14="http://schemas.microsoft.com/office/powerpoint/2010/main" val="1579312018"/>
+      </p:ext>
+    </p:extLst>
+  </p:cSld>
+  <p:clrMapOvr>
+    <a:masterClrMapping/>
+  </p:clrMapOvr>
+  <p:timing>
+    <p:tnLst>
+      <p:par>
+        <p:cTn id="1" dur="indefinite" restart="never" nodeType="tmRoot"/>
+      </p:par>
+    </p:tnLst>
+  </p:timing>
+</p:sld>
+</file>
+
 <file path=ppt/theme/theme1.xml><?xml version="1.0" encoding="utf-8"?>
 <a:theme xmlns:a="http://schemas.openxmlformats.org/drawingml/2006/main" name="Thème Office">
   <a:themeElements>

</xml_diff>